<commit_message>
Added slide on wget for Mac
</commit_message>
<xml_diff>
--- a/How_to_NLDAS2 data.pptx
+++ b/How_to_NLDAS2 data.pptx
@@ -7,20 +7,21 @@
   <p:sldIdLst>
     <p:sldId id="256" r:id="rId2"/>
     <p:sldId id="258" r:id="rId3"/>
-    <p:sldId id="257" r:id="rId4"/>
-    <p:sldId id="259" r:id="rId5"/>
-    <p:sldId id="260" r:id="rId6"/>
-    <p:sldId id="262" r:id="rId7"/>
-    <p:sldId id="261" r:id="rId8"/>
-    <p:sldId id="263" r:id="rId9"/>
-    <p:sldId id="264" r:id="rId10"/>
-    <p:sldId id="265" r:id="rId11"/>
-    <p:sldId id="266" r:id="rId12"/>
-    <p:sldId id="267" r:id="rId13"/>
-    <p:sldId id="271" r:id="rId14"/>
-    <p:sldId id="268" r:id="rId15"/>
-    <p:sldId id="269" r:id="rId16"/>
-    <p:sldId id="273" r:id="rId17"/>
+    <p:sldId id="274" r:id="rId4"/>
+    <p:sldId id="257" r:id="rId5"/>
+    <p:sldId id="259" r:id="rId6"/>
+    <p:sldId id="260" r:id="rId7"/>
+    <p:sldId id="262" r:id="rId8"/>
+    <p:sldId id="261" r:id="rId9"/>
+    <p:sldId id="263" r:id="rId10"/>
+    <p:sldId id="264" r:id="rId11"/>
+    <p:sldId id="265" r:id="rId12"/>
+    <p:sldId id="266" r:id="rId13"/>
+    <p:sldId id="267" r:id="rId14"/>
+    <p:sldId id="271" r:id="rId15"/>
+    <p:sldId id="268" r:id="rId16"/>
+    <p:sldId id="269" r:id="rId17"/>
+    <p:sldId id="273" r:id="rId18"/>
   </p:sldIdLst>
   <p:sldSz cx="12192000" cy="6858000"/>
   <p:notesSz cx="6858000" cy="9144000"/>
@@ -274,7 +275,7 @@
           <a:p>
             <a:fld id="{3376BA8D-1FD2-4E12-8F6B-BA8EEB68D67B}" type="datetimeFigureOut">
               <a:rPr lang="en-US" smtClean="0"/>
-              <a:t>6/19/2024</a:t>
+              <a:t>6/27/2024</a:t>
             </a:fld>
             <a:endParaRPr lang="en-US"/>
           </a:p>
@@ -472,7 +473,7 @@
           <a:p>
             <a:fld id="{3376BA8D-1FD2-4E12-8F6B-BA8EEB68D67B}" type="datetimeFigureOut">
               <a:rPr lang="en-US" smtClean="0"/>
-              <a:t>6/19/2024</a:t>
+              <a:t>6/27/2024</a:t>
             </a:fld>
             <a:endParaRPr lang="en-US"/>
           </a:p>
@@ -680,7 +681,7 @@
           <a:p>
             <a:fld id="{3376BA8D-1FD2-4E12-8F6B-BA8EEB68D67B}" type="datetimeFigureOut">
               <a:rPr lang="en-US" smtClean="0"/>
-              <a:t>6/19/2024</a:t>
+              <a:t>6/27/2024</a:t>
             </a:fld>
             <a:endParaRPr lang="en-US"/>
           </a:p>
@@ -878,7 +879,7 @@
           <a:p>
             <a:fld id="{3376BA8D-1FD2-4E12-8F6B-BA8EEB68D67B}" type="datetimeFigureOut">
               <a:rPr lang="en-US" smtClean="0"/>
-              <a:t>6/19/2024</a:t>
+              <a:t>6/27/2024</a:t>
             </a:fld>
             <a:endParaRPr lang="en-US"/>
           </a:p>
@@ -1153,7 +1154,7 @@
           <a:p>
             <a:fld id="{3376BA8D-1FD2-4E12-8F6B-BA8EEB68D67B}" type="datetimeFigureOut">
               <a:rPr lang="en-US" smtClean="0"/>
-              <a:t>6/19/2024</a:t>
+              <a:t>6/27/2024</a:t>
             </a:fld>
             <a:endParaRPr lang="en-US"/>
           </a:p>
@@ -1418,7 +1419,7 @@
           <a:p>
             <a:fld id="{3376BA8D-1FD2-4E12-8F6B-BA8EEB68D67B}" type="datetimeFigureOut">
               <a:rPr lang="en-US" smtClean="0"/>
-              <a:t>6/19/2024</a:t>
+              <a:t>6/27/2024</a:t>
             </a:fld>
             <a:endParaRPr lang="en-US"/>
           </a:p>
@@ -1830,7 +1831,7 @@
           <a:p>
             <a:fld id="{3376BA8D-1FD2-4E12-8F6B-BA8EEB68D67B}" type="datetimeFigureOut">
               <a:rPr lang="en-US" smtClean="0"/>
-              <a:t>6/19/2024</a:t>
+              <a:t>6/27/2024</a:t>
             </a:fld>
             <a:endParaRPr lang="en-US"/>
           </a:p>
@@ -1971,7 +1972,7 @@
           <a:p>
             <a:fld id="{3376BA8D-1FD2-4E12-8F6B-BA8EEB68D67B}" type="datetimeFigureOut">
               <a:rPr lang="en-US" smtClean="0"/>
-              <a:t>6/19/2024</a:t>
+              <a:t>6/27/2024</a:t>
             </a:fld>
             <a:endParaRPr lang="en-US"/>
           </a:p>
@@ -2084,7 +2085,7 @@
           <a:p>
             <a:fld id="{3376BA8D-1FD2-4E12-8F6B-BA8EEB68D67B}" type="datetimeFigureOut">
               <a:rPr lang="en-US" smtClean="0"/>
-              <a:t>6/19/2024</a:t>
+              <a:t>6/27/2024</a:t>
             </a:fld>
             <a:endParaRPr lang="en-US"/>
           </a:p>
@@ -2395,7 +2396,7 @@
           <a:p>
             <a:fld id="{3376BA8D-1FD2-4E12-8F6B-BA8EEB68D67B}" type="datetimeFigureOut">
               <a:rPr lang="en-US" smtClean="0"/>
-              <a:t>6/19/2024</a:t>
+              <a:t>6/27/2024</a:t>
             </a:fld>
             <a:endParaRPr lang="en-US"/>
           </a:p>
@@ -2683,7 +2684,7 @@
           <a:p>
             <a:fld id="{3376BA8D-1FD2-4E12-8F6B-BA8EEB68D67B}" type="datetimeFigureOut">
               <a:rPr lang="en-US" smtClean="0"/>
-              <a:t>6/19/2024</a:t>
+              <a:t>6/27/2024</a:t>
             </a:fld>
             <a:endParaRPr lang="en-US"/>
           </a:p>
@@ -2924,7 +2925,7 @@
           <a:p>
             <a:fld id="{3376BA8D-1FD2-4E12-8F6B-BA8EEB68D67B}" type="datetimeFigureOut">
               <a:rPr lang="en-US" smtClean="0"/>
-              <a:t>6/19/2024</a:t>
+              <a:t>6/27/2024</a:t>
             </a:fld>
             <a:endParaRPr lang="en-US"/>
           </a:p>
@@ -3443,6 +3444,112 @@
           <p:cNvPr id="2" name="Title 1">
             <a:extLst>
               <a:ext uri="{FF2B5EF4-FFF2-40B4-BE49-F238E27FC236}">
+                <a16:creationId xmlns:a16="http://schemas.microsoft.com/office/drawing/2014/main" id="{978E7F0C-A149-6488-77D8-205C780907A2}"/>
+              </a:ext>
+            </a:extLst>
+          </p:cNvPr>
+          <p:cNvSpPr>
+            <a:spLocks noGrp="1"/>
+          </p:cNvSpPr>
+          <p:nvPr>
+            <p:ph type="title"/>
+          </p:nvPr>
+        </p:nvSpPr>
+        <p:spPr/>
+        <p:txBody>
+          <a:bodyPr/>
+          <a:lstStyle/>
+          <a:p>
+            <a:r>
+              <a:rPr lang="en-US" dirty="0"/>
+              <a:t>5. </a:t>
+            </a:r>
+            <a:r>
+              <a:rPr lang="en-US" dirty="0" err="1"/>
+              <a:t>wget</a:t>
+            </a:r>
+            <a:r>
+              <a:rPr lang="en-US" dirty="0"/>
+              <a:t> will retrieve most of the files, but many downloads will fail.</a:t>
+            </a:r>
+          </a:p>
+        </p:txBody>
+      </p:sp>
+      <p:sp>
+        <p:nvSpPr>
+          <p:cNvPr id="3" name="Content Placeholder 2">
+            <a:extLst>
+              <a:ext uri="{FF2B5EF4-FFF2-40B4-BE49-F238E27FC236}">
+                <a16:creationId xmlns:a16="http://schemas.microsoft.com/office/drawing/2014/main" id="{46AE2D95-4F70-5F21-E59F-7BEAAE9C8DC1}"/>
+              </a:ext>
+            </a:extLst>
+          </p:cNvPr>
+          <p:cNvSpPr>
+            <a:spLocks noGrp="1"/>
+          </p:cNvSpPr>
+          <p:nvPr>
+            <p:ph idx="1"/>
+          </p:nvPr>
+        </p:nvSpPr>
+        <p:spPr/>
+        <p:txBody>
+          <a:bodyPr/>
+          <a:lstStyle/>
+          <a:p>
+            <a:r>
+              <a:rPr lang="en-US" dirty="0"/>
+              <a:t>Edit line 6 of 01_checkNLDAScompleteness.R to point to your list of links</a:t>
+            </a:r>
+          </a:p>
+          <a:p>
+            <a:r>
+              <a:rPr lang="en-US" dirty="0"/>
+              <a:t>Run 01_checkNLDAScompleteness.R. This may take a few minutes.</a:t>
+            </a:r>
+          </a:p>
+          <a:p>
+            <a:r>
+              <a:rPr lang="en-US" dirty="0"/>
+              <a:t>Check todownload.txt to make sure it includes the files that were not previously downloaded.</a:t>
+            </a:r>
+          </a:p>
+        </p:txBody>
+      </p:sp>
+    </p:spTree>
+    <p:extLst>
+      <p:ext uri="{BB962C8B-B14F-4D97-AF65-F5344CB8AC3E}">
+        <p14:creationId xmlns:p14="http://schemas.microsoft.com/office/powerpoint/2010/main" val="150441125"/>
+      </p:ext>
+    </p:extLst>
+  </p:cSld>
+  <p:clrMapOvr>
+    <a:masterClrMapping/>
+  </p:clrMapOvr>
+</p:sld>
+</file>
+
+<file path=ppt/slides/slide11.xml><?xml version="1.0" encoding="utf-8"?>
+<p:sld xmlns:a="http://schemas.openxmlformats.org/drawingml/2006/main" xmlns:r="http://schemas.openxmlformats.org/officeDocument/2006/relationships" xmlns:p="http://schemas.openxmlformats.org/presentationml/2006/main">
+  <p:cSld>
+    <p:spTree>
+      <p:nvGrpSpPr>
+        <p:cNvPr id="1" name=""/>
+        <p:cNvGrpSpPr/>
+        <p:nvPr/>
+      </p:nvGrpSpPr>
+      <p:grpSpPr>
+        <a:xfrm>
+          <a:off x="0" y="0"/>
+          <a:ext cx="0" cy="0"/>
+          <a:chOff x="0" y="0"/>
+          <a:chExt cx="0" cy="0"/>
+        </a:xfrm>
+      </p:grpSpPr>
+      <p:sp>
+        <p:nvSpPr>
+          <p:cNvPr id="2" name="Title 1">
+            <a:extLst>
+              <a:ext uri="{FF2B5EF4-FFF2-40B4-BE49-F238E27FC236}">
                 <a16:creationId xmlns:a16="http://schemas.microsoft.com/office/drawing/2014/main" id="{AA0AED4C-F189-8C90-B6FD-3AC67A66F277}"/>
               </a:ext>
             </a:extLst>
@@ -3572,69 +3679,6 @@
 </p:sld>
 </file>
 
-<file path=ppt/slides/slide11.xml><?xml version="1.0" encoding="utf-8"?>
-<p:sld xmlns:a="http://schemas.openxmlformats.org/drawingml/2006/main" xmlns:r="http://schemas.openxmlformats.org/officeDocument/2006/relationships" xmlns:p="http://schemas.openxmlformats.org/presentationml/2006/main">
-  <p:cSld>
-    <p:spTree>
-      <p:nvGrpSpPr>
-        <p:cNvPr id="1" name=""/>
-        <p:cNvGrpSpPr/>
-        <p:nvPr/>
-      </p:nvGrpSpPr>
-      <p:grpSpPr>
-        <a:xfrm>
-          <a:off x="0" y="0"/>
-          <a:ext cx="0" cy="0"/>
-          <a:chOff x="0" y="0"/>
-          <a:chExt cx="0" cy="0"/>
-        </a:xfrm>
-      </p:grpSpPr>
-      <p:sp>
-        <p:nvSpPr>
-          <p:cNvPr id="2" name="Title 1">
-            <a:extLst>
-              <a:ext uri="{FF2B5EF4-FFF2-40B4-BE49-F238E27FC236}">
-                <a16:creationId xmlns:a16="http://schemas.microsoft.com/office/drawing/2014/main" id="{7B98FA78-36A7-D308-7AB2-19C1549EFE27}"/>
-              </a:ext>
-            </a:extLst>
-          </p:cNvPr>
-          <p:cNvSpPr>
-            <a:spLocks noGrp="1"/>
-          </p:cNvSpPr>
-          <p:nvPr>
-            <p:ph type="title"/>
-          </p:nvPr>
-        </p:nvSpPr>
-        <p:spPr>
-          <a:xfrm>
-            <a:off x="838200" y="2766218"/>
-            <a:ext cx="10515600" cy="1325563"/>
-          </a:xfrm>
-        </p:spPr>
-        <p:txBody>
-          <a:bodyPr/>
-          <a:lstStyle/>
-          <a:p>
-            <a:r>
-              <a:rPr lang="en-US" dirty="0"/>
-              <a:t>7. Repeat steps 5 and 6 until there are no missing files. This may take many repetitions.</a:t>
-            </a:r>
-          </a:p>
-        </p:txBody>
-      </p:sp>
-    </p:spTree>
-    <p:extLst>
-      <p:ext uri="{BB962C8B-B14F-4D97-AF65-F5344CB8AC3E}">
-        <p14:creationId xmlns:p14="http://schemas.microsoft.com/office/powerpoint/2010/main" val="2011247171"/>
-      </p:ext>
-    </p:extLst>
-  </p:cSld>
-  <p:clrMapOvr>
-    <a:masterClrMapping/>
-  </p:clrMapOvr>
-</p:sld>
-</file>
-
 <file path=ppt/slides/slide12.xml><?xml version="1.0" encoding="utf-8"?>
 <p:sld xmlns:a="http://schemas.openxmlformats.org/drawingml/2006/main" xmlns:r="http://schemas.openxmlformats.org/officeDocument/2006/relationships" xmlns:p="http://schemas.openxmlformats.org/presentationml/2006/main">
   <p:cSld>
@@ -3657,7 +3701,7 @@
           <p:cNvPr id="2" name="Title 1">
             <a:extLst>
               <a:ext uri="{FF2B5EF4-FFF2-40B4-BE49-F238E27FC236}">
-                <a16:creationId xmlns:a16="http://schemas.microsoft.com/office/drawing/2014/main" id="{882DFB3C-D170-ACF1-FBB8-43394E2EE7EC}"/>
+                <a16:creationId xmlns:a16="http://schemas.microsoft.com/office/drawing/2014/main" id="{7B98FA78-36A7-D308-7AB2-19C1549EFE27}"/>
               </a:ext>
             </a:extLst>
           </p:cNvPr>
@@ -3668,59 +3712,19 @@
             <p:ph type="title"/>
           </p:nvPr>
         </p:nvSpPr>
-        <p:spPr/>
+        <p:spPr>
+          <a:xfrm>
+            <a:off x="838200" y="2766218"/>
+            <a:ext cx="10515600" cy="1325563"/>
+          </a:xfrm>
+        </p:spPr>
         <p:txBody>
           <a:bodyPr/>
           <a:lstStyle/>
           <a:p>
             <a:r>
               <a:rPr lang="en-US" dirty="0"/>
-              <a:t>8. Run 02_sortNLDAS.R</a:t>
-            </a:r>
-          </a:p>
-        </p:txBody>
-      </p:sp>
-      <p:sp>
-        <p:nvSpPr>
-          <p:cNvPr id="3" name="Content Placeholder 2">
-            <a:extLst>
-              <a:ext uri="{FF2B5EF4-FFF2-40B4-BE49-F238E27FC236}">
-                <a16:creationId xmlns:a16="http://schemas.microsoft.com/office/drawing/2014/main" id="{4AB046A1-61A1-47F3-64A4-148DB403F07C}"/>
-              </a:ext>
-            </a:extLst>
-          </p:cNvPr>
-          <p:cNvSpPr>
-            <a:spLocks noGrp="1"/>
-          </p:cNvSpPr>
-          <p:nvPr>
-            <p:ph idx="1"/>
-          </p:nvPr>
-        </p:nvSpPr>
-        <p:spPr/>
-        <p:txBody>
-          <a:bodyPr/>
-          <a:lstStyle/>
-          <a:p>
-            <a:r>
-              <a:rPr lang="en-US" dirty="0"/>
-              <a:t>Be sure to set the Lake Name on line 4. Use underscores instead of spaces (e.g. “</a:t>
-            </a:r>
-            <a:r>
-              <a:rPr lang="en-US" dirty="0" err="1"/>
-              <a:t>Trout_Lake</a:t>
-            </a:r>
-            <a:r>
-              <a:rPr lang="en-US" dirty="0"/>
-              <a:t>”)</a:t>
-            </a:r>
-          </a:p>
-          <a:p>
-            <a:endParaRPr lang="en-US" dirty="0"/>
-          </a:p>
-          <a:p>
-            <a:r>
-              <a:rPr lang="en-US" dirty="0"/>
-              <a:t>This may take a few minutes.</a:t>
+              <a:t>7. Repeat steps 5 and 6 until there are no missing files. This may take many repetitions.</a:t>
             </a:r>
           </a:p>
         </p:txBody>
@@ -3728,7 +3732,7 @@
     </p:spTree>
     <p:extLst>
       <p:ext uri="{BB962C8B-B14F-4D97-AF65-F5344CB8AC3E}">
-        <p14:creationId xmlns:p14="http://schemas.microsoft.com/office/powerpoint/2010/main" val="1696062247"/>
+        <p14:creationId xmlns:p14="http://schemas.microsoft.com/office/powerpoint/2010/main" val="2011247171"/>
       </p:ext>
     </p:extLst>
   </p:cSld>
@@ -3778,7 +3782,7 @@
           <a:p>
             <a:r>
               <a:rPr lang="en-US" dirty="0"/>
-              <a:t>8. Run 03_combineNLDAS.R</a:t>
+              <a:t>8. Run 02_sortNLDAS.R</a:t>
             </a:r>
           </a:p>
         </p:txBody>
@@ -3806,7 +3810,15 @@
           <a:p>
             <a:r>
               <a:rPr lang="en-US" dirty="0"/>
-              <a:t>Be sure to set the Lake Name on line 19. Use the same name as 02_sortNLDAS.R</a:t>
+              <a:t>Be sure to set the Lake Name on line 4. Use underscores instead of spaces (e.g. “</a:t>
+            </a:r>
+            <a:r>
+              <a:rPr lang="en-US" dirty="0" err="1"/>
+              <a:t>Trout_Lake</a:t>
+            </a:r>
+            <a:r>
+              <a:rPr lang="en-US" dirty="0"/>
+              <a:t>”)</a:t>
             </a:r>
           </a:p>
           <a:p>
@@ -3815,29 +3827,15 @@
           <a:p>
             <a:r>
               <a:rPr lang="en-US" dirty="0"/>
-              <a:t>If the number of cells is known, enter it on line 66. If unknown, 6 will work.</a:t>
-            </a:r>
-          </a:p>
-          <a:p>
-            <a:endParaRPr lang="en-US" dirty="0"/>
-          </a:p>
-          <a:p>
-            <a:r>
-              <a:rPr lang="en-US" dirty="0"/>
-              <a:t>This </a:t>
-            </a:r>
-            <a:r>
-              <a:rPr lang="en-US"/>
-              <a:t>process will take a few hours or days.</a:t>
-            </a:r>
-            <a:endParaRPr lang="en-US" dirty="0"/>
+              <a:t>This may take a few minutes.</a:t>
+            </a:r>
           </a:p>
         </p:txBody>
       </p:sp>
     </p:spTree>
     <p:extLst>
       <p:ext uri="{BB962C8B-B14F-4D97-AF65-F5344CB8AC3E}">
-        <p14:creationId xmlns:p14="http://schemas.microsoft.com/office/powerpoint/2010/main" val="613935020"/>
+        <p14:creationId xmlns:p14="http://schemas.microsoft.com/office/powerpoint/2010/main" val="1696062247"/>
       </p:ext>
     </p:extLst>
   </p:cSld>
@@ -3869,7 +3867,7 @@
           <p:cNvPr id="2" name="Title 1">
             <a:extLst>
               <a:ext uri="{FF2B5EF4-FFF2-40B4-BE49-F238E27FC236}">
-                <a16:creationId xmlns:a16="http://schemas.microsoft.com/office/drawing/2014/main" id="{B74FCDA7-91D1-FCB5-B733-BAE51EC9F09F}"/>
+                <a16:creationId xmlns:a16="http://schemas.microsoft.com/office/drawing/2014/main" id="{882DFB3C-D170-ACF1-FBB8-43394E2EE7EC}"/>
               </a:ext>
             </a:extLst>
           </p:cNvPr>
@@ -3887,7 +3885,7 @@
           <a:p>
             <a:r>
               <a:rPr lang="en-US" dirty="0"/>
-              <a:t>9. Run 04_compileNLDAS.R</a:t>
+              <a:t>8. Run 03_combineNLDAS.R</a:t>
             </a:r>
           </a:p>
         </p:txBody>
@@ -3897,7 +3895,7 @@
           <p:cNvPr id="3" name="Content Placeholder 2">
             <a:extLst>
               <a:ext uri="{FF2B5EF4-FFF2-40B4-BE49-F238E27FC236}">
-                <a16:creationId xmlns:a16="http://schemas.microsoft.com/office/drawing/2014/main" id="{51470C1F-07EA-CE2C-23CA-4001B41C08C0}"/>
+                <a16:creationId xmlns:a16="http://schemas.microsoft.com/office/drawing/2014/main" id="{4AB046A1-61A1-47F3-64A4-148DB403F07C}"/>
               </a:ext>
             </a:extLst>
           </p:cNvPr>
@@ -3915,61 +3913,38 @@
           <a:p>
             <a:r>
               <a:rPr lang="en-US" dirty="0"/>
-              <a:t>Be sure to set the</a:t>
-            </a:r>
-          </a:p>
-          <a:p>
-            <a:pPr lvl="1"/>
+              <a:t>Be sure to set the Lake Name on line 19. Use the same name as 02_sortNLDAS.R</a:t>
+            </a:r>
+          </a:p>
+          <a:p>
+            <a:endParaRPr lang="en-US" dirty="0"/>
+          </a:p>
+          <a:p>
             <a:r>
               <a:rPr lang="en-US" dirty="0"/>
-              <a:t>Lake name (line 5) (same as 02_sortNLDAS.R)</a:t>
-            </a:r>
-          </a:p>
-          <a:p>
-            <a:pPr lvl="1"/>
+              <a:t>If the number of cells is known, enter it on line 66. If unknown, 6 will work.</a:t>
+            </a:r>
+          </a:p>
+          <a:p>
+            <a:endParaRPr lang="en-US" dirty="0"/>
+          </a:p>
+          <a:p>
             <a:r>
               <a:rPr lang="en-US" dirty="0"/>
-              <a:t>Lake time zone (line 6) (available on the </a:t>
-            </a:r>
-            <a:r>
-              <a:rPr lang="en-US" dirty="0">
-                <a:hlinkClick r:id="rId2"/>
-              </a:rPr>
-              <a:t>Google Sheet</a:t>
-            </a:r>
-            <a:r>
-              <a:rPr lang="en-US" dirty="0"/>
-              <a:t>)</a:t>
-            </a:r>
-          </a:p>
-          <a:p>
-            <a:pPr lvl="1"/>
-            <a:r>
-              <a:rPr lang="en-US" dirty="0"/>
-              <a:t>Number of cells (line 7) (if known, same as 03_combineNLDAS.R)</a:t>
-            </a:r>
-          </a:p>
-          <a:p>
-            <a:pPr lvl="1"/>
+              <a:t>This </a:t>
+            </a:r>
+            <a:r>
+              <a:rPr lang="en-US"/>
+              <a:t>process will take a few hours or days.</a:t>
+            </a:r>
             <a:endParaRPr lang="en-US" dirty="0"/>
-          </a:p>
-          <a:p>
-            <a:pPr lvl="1"/>
-            <a:endParaRPr lang="en-US" dirty="0"/>
-          </a:p>
-          <a:p>
-            <a:pPr lvl="1"/>
-            <a:r>
-              <a:rPr lang="en-US" dirty="0"/>
-              <a:t>This process will take a few minutes</a:t>
-            </a:r>
           </a:p>
         </p:txBody>
       </p:sp>
     </p:spTree>
     <p:extLst>
       <p:ext uri="{BB962C8B-B14F-4D97-AF65-F5344CB8AC3E}">
-        <p14:creationId xmlns:p14="http://schemas.microsoft.com/office/powerpoint/2010/main" val="3740625872"/>
+        <p14:creationId xmlns:p14="http://schemas.microsoft.com/office/powerpoint/2010/main" val="613935020"/>
       </p:ext>
     </p:extLst>
   </p:cSld>
@@ -4001,6 +3976,138 @@
           <p:cNvPr id="2" name="Title 1">
             <a:extLst>
               <a:ext uri="{FF2B5EF4-FFF2-40B4-BE49-F238E27FC236}">
+                <a16:creationId xmlns:a16="http://schemas.microsoft.com/office/drawing/2014/main" id="{B74FCDA7-91D1-FCB5-B733-BAE51EC9F09F}"/>
+              </a:ext>
+            </a:extLst>
+          </p:cNvPr>
+          <p:cNvSpPr>
+            <a:spLocks noGrp="1"/>
+          </p:cNvSpPr>
+          <p:nvPr>
+            <p:ph type="title"/>
+          </p:nvPr>
+        </p:nvSpPr>
+        <p:spPr/>
+        <p:txBody>
+          <a:bodyPr/>
+          <a:lstStyle/>
+          <a:p>
+            <a:r>
+              <a:rPr lang="en-US" dirty="0"/>
+              <a:t>9. Run 04_compileNLDAS.R</a:t>
+            </a:r>
+          </a:p>
+        </p:txBody>
+      </p:sp>
+      <p:sp>
+        <p:nvSpPr>
+          <p:cNvPr id="3" name="Content Placeholder 2">
+            <a:extLst>
+              <a:ext uri="{FF2B5EF4-FFF2-40B4-BE49-F238E27FC236}">
+                <a16:creationId xmlns:a16="http://schemas.microsoft.com/office/drawing/2014/main" id="{51470C1F-07EA-CE2C-23CA-4001B41C08C0}"/>
+              </a:ext>
+            </a:extLst>
+          </p:cNvPr>
+          <p:cNvSpPr>
+            <a:spLocks noGrp="1"/>
+          </p:cNvSpPr>
+          <p:nvPr>
+            <p:ph idx="1"/>
+          </p:nvPr>
+        </p:nvSpPr>
+        <p:spPr/>
+        <p:txBody>
+          <a:bodyPr/>
+          <a:lstStyle/>
+          <a:p>
+            <a:r>
+              <a:rPr lang="en-US" dirty="0"/>
+              <a:t>Be sure to set the</a:t>
+            </a:r>
+          </a:p>
+          <a:p>
+            <a:pPr lvl="1"/>
+            <a:r>
+              <a:rPr lang="en-US" dirty="0"/>
+              <a:t>Lake name (line 5) (same as 02_sortNLDAS.R)</a:t>
+            </a:r>
+          </a:p>
+          <a:p>
+            <a:pPr lvl="1"/>
+            <a:r>
+              <a:rPr lang="en-US" dirty="0"/>
+              <a:t>Lake time zone (line 6) (available on the </a:t>
+            </a:r>
+            <a:r>
+              <a:rPr lang="en-US" dirty="0">
+                <a:hlinkClick r:id="rId2"/>
+              </a:rPr>
+              <a:t>Google Sheet</a:t>
+            </a:r>
+            <a:r>
+              <a:rPr lang="en-US" dirty="0"/>
+              <a:t>)</a:t>
+            </a:r>
+          </a:p>
+          <a:p>
+            <a:pPr lvl="1"/>
+            <a:r>
+              <a:rPr lang="en-US" dirty="0"/>
+              <a:t>Number of cells (line 7) (if known, same as 03_combineNLDAS.R)</a:t>
+            </a:r>
+          </a:p>
+          <a:p>
+            <a:pPr lvl="1"/>
+            <a:endParaRPr lang="en-US" dirty="0"/>
+          </a:p>
+          <a:p>
+            <a:pPr lvl="1"/>
+            <a:endParaRPr lang="en-US" dirty="0"/>
+          </a:p>
+          <a:p>
+            <a:pPr lvl="1"/>
+            <a:r>
+              <a:rPr lang="en-US" dirty="0"/>
+              <a:t>This process will take a few minutes</a:t>
+            </a:r>
+          </a:p>
+        </p:txBody>
+      </p:sp>
+    </p:spTree>
+    <p:extLst>
+      <p:ext uri="{BB962C8B-B14F-4D97-AF65-F5344CB8AC3E}">
+        <p14:creationId xmlns:p14="http://schemas.microsoft.com/office/powerpoint/2010/main" val="3740625872"/>
+      </p:ext>
+    </p:extLst>
+  </p:cSld>
+  <p:clrMapOvr>
+    <a:masterClrMapping/>
+  </p:clrMapOvr>
+</p:sld>
+</file>
+
+<file path=ppt/slides/slide16.xml><?xml version="1.0" encoding="utf-8"?>
+<p:sld xmlns:a="http://schemas.openxmlformats.org/drawingml/2006/main" xmlns:r="http://schemas.openxmlformats.org/officeDocument/2006/relationships" xmlns:p="http://schemas.openxmlformats.org/presentationml/2006/main">
+  <p:cSld>
+    <p:spTree>
+      <p:nvGrpSpPr>
+        <p:cNvPr id="1" name=""/>
+        <p:cNvGrpSpPr/>
+        <p:nvPr/>
+      </p:nvGrpSpPr>
+      <p:grpSpPr>
+        <a:xfrm>
+          <a:off x="0" y="0"/>
+          <a:ext cx="0" cy="0"/>
+          <a:chOff x="0" y="0"/>
+          <a:chExt cx="0" cy="0"/>
+        </a:xfrm>
+      </p:grpSpPr>
+      <p:sp>
+        <p:nvSpPr>
+          <p:cNvPr id="2" name="Title 1">
+            <a:extLst>
+              <a:ext uri="{FF2B5EF4-FFF2-40B4-BE49-F238E27FC236}">
                 <a16:creationId xmlns:a16="http://schemas.microsoft.com/office/drawing/2014/main" id="{B3C93DDF-D8E7-BEE3-2F31-6B13AA5113AE}"/>
               </a:ext>
             </a:extLst>
@@ -4083,7 +4190,7 @@
 </p:sld>
 </file>
 
-<file path=ppt/slides/slide16.xml><?xml version="1.0" encoding="utf-8"?>
+<file path=ppt/slides/slide17.xml><?xml version="1.0" encoding="utf-8"?>
 <p:sld xmlns:a="http://schemas.openxmlformats.org/drawingml/2006/main" xmlns:r="http://schemas.openxmlformats.org/officeDocument/2006/relationships" xmlns:p="http://schemas.openxmlformats.org/presentationml/2006/main">
   <p:cSld>
     <p:spTree>
@@ -4217,7 +4324,7 @@
             </a:r>
             <a:r>
               <a:rPr lang="en-US" dirty="0"/>
-              <a:t>. Tutorial: </a:t>
+              <a:t>. Windows tutorial: </a:t>
             </a:r>
             <a:r>
               <a:rPr lang="en-US" dirty="0">
@@ -4254,6 +4361,540 @@
 </file>
 
 <file path=ppt/slides/slide3.xml><?xml version="1.0" encoding="utf-8"?>
+<p:sld xmlns:a="http://schemas.openxmlformats.org/drawingml/2006/main" xmlns:r="http://schemas.openxmlformats.org/officeDocument/2006/relationships" xmlns:p="http://schemas.openxmlformats.org/presentationml/2006/main">
+  <p:cSld>
+    <p:spTree>
+      <p:nvGrpSpPr>
+        <p:cNvPr id="1" name=""/>
+        <p:cNvGrpSpPr/>
+        <p:nvPr/>
+      </p:nvGrpSpPr>
+      <p:grpSpPr>
+        <a:xfrm>
+          <a:off x="0" y="0"/>
+          <a:ext cx="0" cy="0"/>
+          <a:chOff x="0" y="0"/>
+          <a:chExt cx="0" cy="0"/>
+        </a:xfrm>
+      </p:grpSpPr>
+      <p:sp>
+        <p:nvSpPr>
+          <p:cNvPr id="2" name="Title 1">
+            <a:extLst>
+              <a:ext uri="{FF2B5EF4-FFF2-40B4-BE49-F238E27FC236}">
+                <a16:creationId xmlns:a16="http://schemas.microsoft.com/office/drawing/2014/main" id="{6B07261F-4651-92E3-5F6B-452454ED2815}"/>
+              </a:ext>
+            </a:extLst>
+          </p:cNvPr>
+          <p:cNvSpPr>
+            <a:spLocks noGrp="1"/>
+          </p:cNvSpPr>
+          <p:nvPr>
+            <p:ph type="title"/>
+          </p:nvPr>
+        </p:nvSpPr>
+        <p:spPr/>
+        <p:txBody>
+          <a:bodyPr/>
+          <a:lstStyle/>
+          <a:p>
+            <a:r>
+              <a:rPr lang="en-US" dirty="0"/>
+              <a:t>install </a:t>
+            </a:r>
+            <a:r>
+              <a:rPr lang="en-US" dirty="0" err="1"/>
+              <a:t>wget</a:t>
+            </a:r>
+            <a:r>
+              <a:rPr lang="en-US" dirty="0"/>
+              <a:t> on mac</a:t>
+            </a:r>
+          </a:p>
+        </p:txBody>
+      </p:sp>
+      <p:sp>
+        <p:nvSpPr>
+          <p:cNvPr id="3" name="Content Placeholder 2">
+            <a:extLst>
+              <a:ext uri="{FF2B5EF4-FFF2-40B4-BE49-F238E27FC236}">
+                <a16:creationId xmlns:a16="http://schemas.microsoft.com/office/drawing/2014/main" id="{0924B0CB-D595-85F6-F64C-1E34C40E7AF3}"/>
+              </a:ext>
+            </a:extLst>
+          </p:cNvPr>
+          <p:cNvSpPr>
+            <a:spLocks noGrp="1"/>
+          </p:cNvSpPr>
+          <p:nvPr>
+            <p:ph idx="1"/>
+          </p:nvPr>
+        </p:nvSpPr>
+        <p:spPr>
+          <a:xfrm>
+            <a:off x="838200" y="1825625"/>
+            <a:ext cx="3853721" cy="4530205"/>
+          </a:xfrm>
+        </p:spPr>
+        <p:txBody>
+          <a:bodyPr>
+            <a:normAutofit fontScale="92500" lnSpcReduction="20000"/>
+          </a:bodyPr>
+          <a:lstStyle/>
+          <a:p>
+            <a:pPr marL="514350" indent="-514350">
+              <a:spcBef>
+                <a:spcPts val="3400"/>
+              </a:spcBef>
+              <a:buFont typeface="+mj-lt"/>
+              <a:buAutoNum type="arabicPeriod"/>
+            </a:pPr>
+            <a:r>
+              <a:rPr lang="en-US" sz="2400" dirty="0"/>
+              <a:t>check if </a:t>
+            </a:r>
+            <a:r>
+              <a:rPr lang="en-US" sz="2400" dirty="0" err="1"/>
+              <a:t>wget</a:t>
+            </a:r>
+            <a:r>
+              <a:rPr lang="en-US" sz="2400" dirty="0"/>
+              <a:t> is installed (if not, proceed)</a:t>
+            </a:r>
+          </a:p>
+          <a:p>
+            <a:pPr marL="514350" indent="-514350">
+              <a:spcBef>
+                <a:spcPts val="3400"/>
+              </a:spcBef>
+              <a:buFont typeface="+mj-lt"/>
+              <a:buAutoNum type="arabicPeriod"/>
+            </a:pPr>
+            <a:r>
+              <a:rPr lang="en-US" sz="2400" dirty="0"/>
+              <a:t>install homebrew</a:t>
+            </a:r>
+          </a:p>
+          <a:p>
+            <a:pPr marL="514350" indent="-514350">
+              <a:spcBef>
+                <a:spcPts val="3400"/>
+              </a:spcBef>
+              <a:buFont typeface="+mj-lt"/>
+              <a:buAutoNum type="arabicPeriod"/>
+            </a:pPr>
+            <a:endParaRPr lang="en-US" sz="2400" dirty="0"/>
+          </a:p>
+          <a:p>
+            <a:pPr marL="514350" indent="-514350">
+              <a:spcBef>
+                <a:spcPts val="3400"/>
+              </a:spcBef>
+              <a:buFont typeface="+mj-lt"/>
+              <a:buAutoNum type="arabicPeriod"/>
+            </a:pPr>
+            <a:r>
+              <a:rPr lang="en-US" sz="2400" dirty="0"/>
+              <a:t>install </a:t>
+            </a:r>
+            <a:r>
+              <a:rPr lang="en-US" sz="2400" dirty="0" err="1"/>
+              <a:t>wget</a:t>
+            </a:r>
+            <a:endParaRPr lang="en-US" sz="2400" dirty="0"/>
+          </a:p>
+          <a:p>
+            <a:pPr marL="514350" indent="-514350">
+              <a:spcBef>
+                <a:spcPts val="3400"/>
+              </a:spcBef>
+              <a:buFont typeface="+mj-lt"/>
+              <a:buAutoNum type="arabicPeriod"/>
+            </a:pPr>
+            <a:r>
+              <a:rPr lang="en-US" sz="2400" dirty="0"/>
+              <a:t>if “brew” is not found, enter these lines one at a time to change the :PATH</a:t>
+            </a:r>
+          </a:p>
+          <a:p>
+            <a:pPr marL="514350" indent="-514350">
+              <a:spcBef>
+                <a:spcPts val="3400"/>
+              </a:spcBef>
+              <a:buFont typeface="+mj-lt"/>
+              <a:buAutoNum type="arabicPeriod"/>
+            </a:pPr>
+            <a:r>
+              <a:rPr lang="en-US" sz="2400" dirty="0"/>
+              <a:t>try step 3 again</a:t>
+            </a:r>
+          </a:p>
+        </p:txBody>
+      </p:sp>
+      <p:sp>
+        <p:nvSpPr>
+          <p:cNvPr id="4" name="TextBox 3">
+            <a:extLst>
+              <a:ext uri="{FF2B5EF4-FFF2-40B4-BE49-F238E27FC236}">
+                <a16:creationId xmlns:a16="http://schemas.microsoft.com/office/drawing/2014/main" id="{2F5CF466-1B1E-D46D-3EDF-E408AEC27A9C}"/>
+              </a:ext>
+            </a:extLst>
+          </p:cNvPr>
+          <p:cNvSpPr txBox="1"/>
+          <p:nvPr/>
+        </p:nvSpPr>
+        <p:spPr>
+          <a:xfrm>
+            <a:off x="5501388" y="1825625"/>
+            <a:ext cx="6220920" cy="3693319"/>
+          </a:xfrm>
+          <a:prstGeom prst="rect">
+            <a:avLst/>
+          </a:prstGeom>
+          <a:noFill/>
+        </p:spPr>
+        <p:txBody>
+          <a:bodyPr wrap="square" rtlCol="0">
+            <a:spAutoFit/>
+          </a:bodyPr>
+          <a:lstStyle/>
+          <a:p>
+            <a:r>
+              <a:rPr lang="en-US" dirty="0" err="1"/>
+              <a:t>wget</a:t>
+            </a:r>
+            <a:r>
+              <a:rPr lang="en-US" dirty="0"/>
+              <a:t> -V</a:t>
+            </a:r>
+          </a:p>
+          <a:p>
+            <a:endParaRPr lang="en-US" dirty="0"/>
+          </a:p>
+          <a:p>
+            <a:endParaRPr lang="en-US" dirty="0"/>
+          </a:p>
+          <a:p>
+            <a:r>
+              <a:rPr lang="en-US" dirty="0"/>
+              <a:t>/bin/bash -c "$(curl -</a:t>
+            </a:r>
+            <a:r>
+              <a:rPr lang="en-US" dirty="0" err="1"/>
+              <a:t>fsSL</a:t>
+            </a:r>
+            <a:r>
+              <a:rPr lang="en-US" dirty="0"/>
+              <a:t> https://raw.githubusercontent.com/Homebrew/install/HEAD/install.sh)”</a:t>
+            </a:r>
+          </a:p>
+          <a:p>
+            <a:endParaRPr lang="en-US" dirty="0"/>
+          </a:p>
+          <a:p>
+            <a:endParaRPr lang="en-US" dirty="0"/>
+          </a:p>
+          <a:p>
+            <a:r>
+              <a:rPr lang="en-US" dirty="0"/>
+              <a:t>brew install </a:t>
+            </a:r>
+            <a:r>
+              <a:rPr lang="en-US" dirty="0" err="1"/>
+              <a:t>wget</a:t>
+            </a:r>
+            <a:endParaRPr lang="en-US" dirty="0"/>
+          </a:p>
+          <a:p>
+            <a:endParaRPr lang="en-US" dirty="0"/>
+          </a:p>
+          <a:p>
+            <a:r>
+              <a:rPr lang="en-US" dirty="0"/>
+              <a:t>echo 'eval $(/opt/homebrew/bin/brew </a:t>
+            </a:r>
+            <a:r>
+              <a:rPr lang="en-US" dirty="0" err="1"/>
+              <a:t>shellenv</a:t>
+            </a:r>
+            <a:r>
+              <a:rPr lang="en-US" dirty="0"/>
+              <a:t>)' &gt;&gt; ~/.</a:t>
+            </a:r>
+            <a:r>
+              <a:rPr lang="en-US" dirty="0" err="1"/>
+              <a:t>zprofile</a:t>
+            </a:r>
+            <a:endParaRPr lang="en-US" dirty="0"/>
+          </a:p>
+          <a:p>
+            <a:endParaRPr lang="en-US" dirty="0"/>
+          </a:p>
+          <a:p>
+            <a:r>
+              <a:rPr lang="en-US" dirty="0"/>
+              <a:t>eval $(/opt/homebrew/bin/brew </a:t>
+            </a:r>
+            <a:r>
+              <a:rPr lang="en-US" dirty="0" err="1"/>
+              <a:t>shellenv</a:t>
+            </a:r>
+            <a:r>
+              <a:rPr lang="en-US" dirty="0"/>
+              <a:t>)</a:t>
+            </a:r>
+          </a:p>
+        </p:txBody>
+      </p:sp>
+      <p:cxnSp>
+        <p:nvCxnSpPr>
+          <p:cNvPr id="6" name="Straight Connector 5">
+            <a:extLst>
+              <a:ext uri="{FF2B5EF4-FFF2-40B4-BE49-F238E27FC236}">
+                <a16:creationId xmlns:a16="http://schemas.microsoft.com/office/drawing/2014/main" id="{D8316B35-F7EF-DEA9-2660-7CDF9C883ED7}"/>
+              </a:ext>
+            </a:extLst>
+          </p:cNvPr>
+          <p:cNvCxnSpPr>
+            <a:cxnSpLocks/>
+          </p:cNvCxnSpPr>
+          <p:nvPr/>
+        </p:nvCxnSpPr>
+        <p:spPr>
+          <a:xfrm>
+            <a:off x="733581" y="2503357"/>
+            <a:ext cx="10934075" cy="0"/>
+          </a:xfrm>
+          <a:prstGeom prst="line">
+            <a:avLst/>
+          </a:prstGeom>
+        </p:spPr>
+        <p:style>
+          <a:lnRef idx="2">
+            <a:schemeClr val="accent1"/>
+          </a:lnRef>
+          <a:fillRef idx="0">
+            <a:schemeClr val="accent1"/>
+          </a:fillRef>
+          <a:effectRef idx="1">
+            <a:schemeClr val="accent1"/>
+          </a:effectRef>
+          <a:fontRef idx="minor">
+            <a:schemeClr val="tx1"/>
+          </a:fontRef>
+        </p:style>
+      </p:cxnSp>
+      <p:cxnSp>
+        <p:nvCxnSpPr>
+          <p:cNvPr id="7" name="Straight Connector 6">
+            <a:extLst>
+              <a:ext uri="{FF2B5EF4-FFF2-40B4-BE49-F238E27FC236}">
+                <a16:creationId xmlns:a16="http://schemas.microsoft.com/office/drawing/2014/main" id="{20196140-7FC6-B62E-AC4A-78911FACE234}"/>
+              </a:ext>
+            </a:extLst>
+          </p:cNvPr>
+          <p:cNvCxnSpPr>
+            <a:cxnSpLocks/>
+          </p:cNvCxnSpPr>
+          <p:nvPr/>
+        </p:nvCxnSpPr>
+        <p:spPr>
+          <a:xfrm>
+            <a:off x="733581" y="3824989"/>
+            <a:ext cx="10934075" cy="0"/>
+          </a:xfrm>
+          <a:prstGeom prst="line">
+            <a:avLst/>
+          </a:prstGeom>
+        </p:spPr>
+        <p:style>
+          <a:lnRef idx="2">
+            <a:schemeClr val="accent1"/>
+          </a:lnRef>
+          <a:fillRef idx="0">
+            <a:schemeClr val="accent1"/>
+          </a:fillRef>
+          <a:effectRef idx="1">
+            <a:schemeClr val="accent1"/>
+          </a:effectRef>
+          <a:fontRef idx="minor">
+            <a:schemeClr val="tx1"/>
+          </a:fontRef>
+        </p:style>
+      </p:cxnSp>
+      <p:cxnSp>
+        <p:nvCxnSpPr>
+          <p:cNvPr id="8" name="Straight Connector 7">
+            <a:extLst>
+              <a:ext uri="{FF2B5EF4-FFF2-40B4-BE49-F238E27FC236}">
+                <a16:creationId xmlns:a16="http://schemas.microsoft.com/office/drawing/2014/main" id="{A6F36CF3-AB7C-3C5A-66A3-02DE16219A72}"/>
+              </a:ext>
+            </a:extLst>
+          </p:cNvPr>
+          <p:cNvCxnSpPr>
+            <a:cxnSpLocks/>
+          </p:cNvCxnSpPr>
+          <p:nvPr/>
+        </p:nvCxnSpPr>
+        <p:spPr>
+          <a:xfrm>
+            <a:off x="733581" y="4487056"/>
+            <a:ext cx="10934075" cy="0"/>
+          </a:xfrm>
+          <a:prstGeom prst="line">
+            <a:avLst/>
+          </a:prstGeom>
+        </p:spPr>
+        <p:style>
+          <a:lnRef idx="2">
+            <a:schemeClr val="accent1"/>
+          </a:lnRef>
+          <a:fillRef idx="0">
+            <a:schemeClr val="accent1"/>
+          </a:fillRef>
+          <a:effectRef idx="1">
+            <a:schemeClr val="accent1"/>
+          </a:effectRef>
+          <a:fontRef idx="minor">
+            <a:schemeClr val="tx1"/>
+          </a:fontRef>
+        </p:style>
+      </p:cxnSp>
+      <p:cxnSp>
+        <p:nvCxnSpPr>
+          <p:cNvPr id="9" name="Straight Connector 8">
+            <a:extLst>
+              <a:ext uri="{FF2B5EF4-FFF2-40B4-BE49-F238E27FC236}">
+                <a16:creationId xmlns:a16="http://schemas.microsoft.com/office/drawing/2014/main" id="{DBEBE2B7-E4DB-520A-8997-BC00F72CC544}"/>
+              </a:ext>
+            </a:extLst>
+          </p:cNvPr>
+          <p:cNvCxnSpPr>
+            <a:cxnSpLocks/>
+          </p:cNvCxnSpPr>
+          <p:nvPr/>
+        </p:nvCxnSpPr>
+        <p:spPr>
+          <a:xfrm>
+            <a:off x="733581" y="5676341"/>
+            <a:ext cx="10934075" cy="0"/>
+          </a:xfrm>
+          <a:prstGeom prst="line">
+            <a:avLst/>
+          </a:prstGeom>
+        </p:spPr>
+        <p:style>
+          <a:lnRef idx="2">
+            <a:schemeClr val="accent1"/>
+          </a:lnRef>
+          <a:fillRef idx="0">
+            <a:schemeClr val="accent1"/>
+          </a:fillRef>
+          <a:effectRef idx="1">
+            <a:schemeClr val="accent1"/>
+          </a:effectRef>
+          <a:fontRef idx="minor">
+            <a:schemeClr val="tx1"/>
+          </a:fontRef>
+        </p:style>
+      </p:cxnSp>
+      <p:sp>
+        <p:nvSpPr>
+          <p:cNvPr id="10" name="Down Arrow Callout 9">
+            <a:extLst>
+              <a:ext uri="{FF2B5EF4-FFF2-40B4-BE49-F238E27FC236}">
+                <a16:creationId xmlns:a16="http://schemas.microsoft.com/office/drawing/2014/main" id="{6A7AA378-B3D0-9295-3AF9-E59AE72139CC}"/>
+              </a:ext>
+            </a:extLst>
+          </p:cNvPr>
+          <p:cNvSpPr/>
+          <p:nvPr/>
+        </p:nvSpPr>
+        <p:spPr>
+          <a:xfrm>
+            <a:off x="5591331" y="709468"/>
+            <a:ext cx="3102964" cy="944380"/>
+          </a:xfrm>
+          <a:prstGeom prst="downArrowCallout">
+            <a:avLst/>
+          </a:prstGeom>
+        </p:spPr>
+        <p:style>
+          <a:lnRef idx="2">
+            <a:schemeClr val="accent1">
+              <a:shade val="15000"/>
+            </a:schemeClr>
+          </a:lnRef>
+          <a:fillRef idx="1">
+            <a:schemeClr val="accent1"/>
+          </a:fillRef>
+          <a:effectRef idx="0">
+            <a:schemeClr val="accent1"/>
+          </a:effectRef>
+          <a:fontRef idx="minor">
+            <a:schemeClr val="lt1"/>
+          </a:fontRef>
+        </p:style>
+        <p:txBody>
+          <a:bodyPr rtlCol="0" anchor="ctr"/>
+          <a:lstStyle/>
+          <a:p>
+            <a:pPr algn="ctr"/>
+            <a:r>
+              <a:rPr lang="en-US" dirty="0"/>
+              <a:t>copy-paste or type the following into the Terminal</a:t>
+            </a:r>
+          </a:p>
+        </p:txBody>
+      </p:sp>
+      <p:sp>
+        <p:nvSpPr>
+          <p:cNvPr id="5" name="TextBox 4">
+            <a:extLst>
+              <a:ext uri="{FF2B5EF4-FFF2-40B4-BE49-F238E27FC236}">
+                <a16:creationId xmlns:a16="http://schemas.microsoft.com/office/drawing/2014/main" id="{E07F8025-100B-6CCD-E065-B7E15C0838DC}"/>
+              </a:ext>
+            </a:extLst>
+          </p:cNvPr>
+          <p:cNvSpPr txBox="1"/>
+          <p:nvPr/>
+        </p:nvSpPr>
+        <p:spPr>
+          <a:xfrm>
+            <a:off x="10164793" y="-9990"/>
+            <a:ext cx="2027207" cy="646331"/>
+          </a:xfrm>
+          <a:prstGeom prst="rect">
+            <a:avLst/>
+          </a:prstGeom>
+          <a:noFill/>
+        </p:spPr>
+        <p:txBody>
+          <a:bodyPr wrap="square" rtlCol="0">
+            <a:spAutoFit/>
+          </a:bodyPr>
+          <a:lstStyle/>
+          <a:p>
+            <a:r>
+              <a:rPr lang="en-US" dirty="0"/>
+              <a:t>Slide courtesy of Sophia Skoglund</a:t>
+            </a:r>
+          </a:p>
+        </p:txBody>
+      </p:sp>
+    </p:spTree>
+    <p:extLst>
+      <p:ext uri="{BB962C8B-B14F-4D97-AF65-F5344CB8AC3E}">
+        <p14:creationId xmlns:p14="http://schemas.microsoft.com/office/powerpoint/2010/main" val="1483713158"/>
+      </p:ext>
+    </p:extLst>
+  </p:cSld>
+  <p:clrMapOvr>
+    <a:masterClrMapping/>
+  </p:clrMapOvr>
+</p:sld>
+</file>
+
+<file path=ppt/slides/slide4.xml><?xml version="1.0" encoding="utf-8"?>
 <p:sld xmlns:a="http://schemas.openxmlformats.org/drawingml/2006/main" xmlns:r="http://schemas.openxmlformats.org/officeDocument/2006/relationships" xmlns:p="http://schemas.openxmlformats.org/presentationml/2006/main">
   <p:cSld>
     <p:bg>
@@ -4446,7 +5087,7 @@
 </p:sld>
 </file>
 
-<file path=ppt/slides/slide4.xml><?xml version="1.0" encoding="utf-8"?>
+<file path=ppt/slides/slide5.xml><?xml version="1.0" encoding="utf-8"?>
 <p:sld xmlns:a="http://schemas.openxmlformats.org/drawingml/2006/main" xmlns:r="http://schemas.openxmlformats.org/officeDocument/2006/relationships" xmlns:p="http://schemas.openxmlformats.org/presentationml/2006/main">
   <p:cSld>
     <p:bg>
@@ -4696,7 +5337,7 @@
 </p:sld>
 </file>
 
-<file path=ppt/slides/slide5.xml><?xml version="1.0" encoding="utf-8"?>
+<file path=ppt/slides/slide6.xml><?xml version="1.0" encoding="utf-8"?>
 <p:sld xmlns:a="http://schemas.openxmlformats.org/drawingml/2006/main" xmlns:r="http://schemas.openxmlformats.org/officeDocument/2006/relationships" xmlns:p="http://schemas.openxmlformats.org/presentationml/2006/main">
   <p:cSld>
     <p:spTree>
@@ -4845,7 +5486,7 @@
 </p:sld>
 </file>
 
-<file path=ppt/slides/slide6.xml><?xml version="1.0" encoding="utf-8"?>
+<file path=ppt/slides/slide7.xml><?xml version="1.0" encoding="utf-8"?>
 <p:sld xmlns:a="http://schemas.openxmlformats.org/drawingml/2006/main" xmlns:r="http://schemas.openxmlformats.org/officeDocument/2006/relationships" xmlns:p="http://schemas.openxmlformats.org/presentationml/2006/main">
   <p:cSld>
     <p:spTree>
@@ -4987,7 +5628,7 @@
 </p:sld>
 </file>
 
-<file path=ppt/slides/slide7.xml><?xml version="1.0" encoding="utf-8"?>
+<file path=ppt/slides/slide8.xml><?xml version="1.0" encoding="utf-8"?>
 <p:sld xmlns:a="http://schemas.openxmlformats.org/drawingml/2006/main" xmlns:r="http://schemas.openxmlformats.org/officeDocument/2006/relationships" xmlns:p="http://schemas.openxmlformats.org/presentationml/2006/main">
   <p:cSld>
     <p:spTree>
@@ -5082,7 +5723,7 @@
 </p:sld>
 </file>
 
-<file path=ppt/slides/slide8.xml><?xml version="1.0" encoding="utf-8"?>
+<file path=ppt/slides/slide9.xml><?xml version="1.0" encoding="utf-8"?>
 <p:sld xmlns:a="http://schemas.openxmlformats.org/drawingml/2006/main" xmlns:r="http://schemas.openxmlformats.org/officeDocument/2006/relationships" xmlns:p="http://schemas.openxmlformats.org/presentationml/2006/main">
   <p:cSld>
     <p:spTree>
@@ -5229,112 +5870,6 @@
     <p:extLst>
       <p:ext uri="{BB962C8B-B14F-4D97-AF65-F5344CB8AC3E}">
         <p14:creationId xmlns:p14="http://schemas.microsoft.com/office/powerpoint/2010/main" val="1839262055"/>
-      </p:ext>
-    </p:extLst>
-  </p:cSld>
-  <p:clrMapOvr>
-    <a:masterClrMapping/>
-  </p:clrMapOvr>
-</p:sld>
-</file>
-
-<file path=ppt/slides/slide9.xml><?xml version="1.0" encoding="utf-8"?>
-<p:sld xmlns:a="http://schemas.openxmlformats.org/drawingml/2006/main" xmlns:r="http://schemas.openxmlformats.org/officeDocument/2006/relationships" xmlns:p="http://schemas.openxmlformats.org/presentationml/2006/main">
-  <p:cSld>
-    <p:spTree>
-      <p:nvGrpSpPr>
-        <p:cNvPr id="1" name=""/>
-        <p:cNvGrpSpPr/>
-        <p:nvPr/>
-      </p:nvGrpSpPr>
-      <p:grpSpPr>
-        <a:xfrm>
-          <a:off x="0" y="0"/>
-          <a:ext cx="0" cy="0"/>
-          <a:chOff x="0" y="0"/>
-          <a:chExt cx="0" cy="0"/>
-        </a:xfrm>
-      </p:grpSpPr>
-      <p:sp>
-        <p:nvSpPr>
-          <p:cNvPr id="2" name="Title 1">
-            <a:extLst>
-              <a:ext uri="{FF2B5EF4-FFF2-40B4-BE49-F238E27FC236}">
-                <a16:creationId xmlns:a16="http://schemas.microsoft.com/office/drawing/2014/main" id="{978E7F0C-A149-6488-77D8-205C780907A2}"/>
-              </a:ext>
-            </a:extLst>
-          </p:cNvPr>
-          <p:cNvSpPr>
-            <a:spLocks noGrp="1"/>
-          </p:cNvSpPr>
-          <p:nvPr>
-            <p:ph type="title"/>
-          </p:nvPr>
-        </p:nvSpPr>
-        <p:spPr/>
-        <p:txBody>
-          <a:bodyPr/>
-          <a:lstStyle/>
-          <a:p>
-            <a:r>
-              <a:rPr lang="en-US" dirty="0"/>
-              <a:t>5. </a:t>
-            </a:r>
-            <a:r>
-              <a:rPr lang="en-US" dirty="0" err="1"/>
-              <a:t>wget</a:t>
-            </a:r>
-            <a:r>
-              <a:rPr lang="en-US" dirty="0"/>
-              <a:t> will retrieve most of the files, but many downloads will fail.</a:t>
-            </a:r>
-          </a:p>
-        </p:txBody>
-      </p:sp>
-      <p:sp>
-        <p:nvSpPr>
-          <p:cNvPr id="3" name="Content Placeholder 2">
-            <a:extLst>
-              <a:ext uri="{FF2B5EF4-FFF2-40B4-BE49-F238E27FC236}">
-                <a16:creationId xmlns:a16="http://schemas.microsoft.com/office/drawing/2014/main" id="{46AE2D95-4F70-5F21-E59F-7BEAAE9C8DC1}"/>
-              </a:ext>
-            </a:extLst>
-          </p:cNvPr>
-          <p:cNvSpPr>
-            <a:spLocks noGrp="1"/>
-          </p:cNvSpPr>
-          <p:nvPr>
-            <p:ph idx="1"/>
-          </p:nvPr>
-        </p:nvSpPr>
-        <p:spPr/>
-        <p:txBody>
-          <a:bodyPr/>
-          <a:lstStyle/>
-          <a:p>
-            <a:r>
-              <a:rPr lang="en-US" dirty="0"/>
-              <a:t>Edit line 6 of 01_checkNLDAScompleteness.R to point to your list of links</a:t>
-            </a:r>
-          </a:p>
-          <a:p>
-            <a:r>
-              <a:rPr lang="en-US" dirty="0"/>
-              <a:t>Run 01_checkNLDAScompleteness.R. This may take a few minutes.</a:t>
-            </a:r>
-          </a:p>
-          <a:p>
-            <a:r>
-              <a:rPr lang="en-US" dirty="0"/>
-              <a:t>Check todownload.txt to make sure it includes the files that were not previously downloaded.</a:t>
-            </a:r>
-          </a:p>
-        </p:txBody>
-      </p:sp>
-    </p:spTree>
-    <p:extLst>
-      <p:ext uri="{BB962C8B-B14F-4D97-AF65-F5344CB8AC3E}">
-        <p14:creationId xmlns:p14="http://schemas.microsoft.com/office/powerpoint/2010/main" val="150441125"/>
       </p:ext>
     </p:extLst>
   </p:cSld>

</xml_diff>

<commit_message>
Update tutorial to specify earthdata loging is needed
</commit_message>
<xml_diff>
--- a/How_to_NLDAS2 data.pptx
+++ b/How_to_NLDAS2 data.pptx
@@ -5784,7 +5784,12 @@
             <p:ph idx="1"/>
           </p:nvPr>
         </p:nvSpPr>
-        <p:spPr/>
+        <p:spPr>
+          <a:xfrm>
+            <a:off x="852487" y="1641870"/>
+            <a:ext cx="10515600" cy="4351338"/>
+          </a:xfrm>
+        </p:spPr>
         <p:txBody>
           <a:bodyPr/>
           <a:lstStyle/>
@@ -5808,7 +5813,23 @@
             </a:r>
             <a:r>
               <a:rPr lang="en-US" sz="1600" dirty="0"/>
-              <a:t> --user [username] --password [password] -</a:t>
+              <a:t> --user [</a:t>
+            </a:r>
+            <a:r>
+              <a:rPr lang="en-US" sz="1600" dirty="0" err="1"/>
+              <a:t>Earthdata</a:t>
+            </a:r>
+            <a:r>
+              <a:rPr lang="en-US" sz="1600" dirty="0"/>
+              <a:t> username] --password [</a:t>
+            </a:r>
+            <a:r>
+              <a:rPr lang="en-US" sz="1600" dirty="0" err="1"/>
+              <a:t>Earthdata</a:t>
+            </a:r>
+            <a:r>
+              <a:rPr lang="en-US" sz="1600" dirty="0"/>
+              <a:t> password] -</a:t>
             </a:r>
             <a:r>
               <a:rPr lang="en-US" sz="1600" dirty="0" err="1"/>
@@ -5831,7 +5852,7 @@
             <a:pPr lvl="1"/>
             <a:r>
               <a:rPr lang="en-US" sz="1600" dirty="0"/>
-              <a:t>Note that this process will take days of uninterrupted internet connection. However, you can start the process where you left off using the script from step 5.</a:t>
+              <a:t>Note that this process will take days of uninterrupted internet connection. However, you can start the process where you left off using steps 5 and 6.</a:t>
             </a:r>
           </a:p>
         </p:txBody>

</xml_diff>